<commit_message>
Update bayesopt using parfor to speed up and implement bayesopt for linear system
</commit_message>
<xml_diff>
--- a/BayesOpt Pose Graph-Week11.pptx
+++ b/BayesOpt Pose Graph-Week11.pptx
@@ -268,7 +268,7 @@
           <a:p>
             <a:fld id="{EC1BCD71-190D-426B-85E9-B8B75E5C9734}" type="datetimeFigureOut">
               <a:rPr lang="en-GB" smtClean="0"/>
-              <a:t>24/07/2023</a:t>
+              <a:t>28/07/2023</a:t>
             </a:fld>
             <a:endParaRPr lang="en-GB"/>
           </a:p>
@@ -468,7 +468,7 @@
           <a:p>
             <a:fld id="{EC1BCD71-190D-426B-85E9-B8B75E5C9734}" type="datetimeFigureOut">
               <a:rPr lang="en-GB" smtClean="0"/>
-              <a:t>24/07/2023</a:t>
+              <a:t>28/07/2023</a:t>
             </a:fld>
             <a:endParaRPr lang="en-GB"/>
           </a:p>
@@ -678,7 +678,7 @@
           <a:p>
             <a:fld id="{EC1BCD71-190D-426B-85E9-B8B75E5C9734}" type="datetimeFigureOut">
               <a:rPr lang="en-GB" smtClean="0"/>
-              <a:t>24/07/2023</a:t>
+              <a:t>28/07/2023</a:t>
             </a:fld>
             <a:endParaRPr lang="en-GB"/>
           </a:p>
@@ -878,7 +878,7 @@
           <a:p>
             <a:fld id="{EC1BCD71-190D-426B-85E9-B8B75E5C9734}" type="datetimeFigureOut">
               <a:rPr lang="en-GB" smtClean="0"/>
-              <a:t>24/07/2023</a:t>
+              <a:t>28/07/2023</a:t>
             </a:fld>
             <a:endParaRPr lang="en-GB"/>
           </a:p>
@@ -1154,7 +1154,7 @@
           <a:p>
             <a:fld id="{EC1BCD71-190D-426B-85E9-B8B75E5C9734}" type="datetimeFigureOut">
               <a:rPr lang="en-GB" smtClean="0"/>
-              <a:t>24/07/2023</a:t>
+              <a:t>28/07/2023</a:t>
             </a:fld>
             <a:endParaRPr lang="en-GB"/>
           </a:p>
@@ -1422,7 +1422,7 @@
           <a:p>
             <a:fld id="{EC1BCD71-190D-426B-85E9-B8B75E5C9734}" type="datetimeFigureOut">
               <a:rPr lang="en-GB" smtClean="0"/>
-              <a:t>24/07/2023</a:t>
+              <a:t>28/07/2023</a:t>
             </a:fld>
             <a:endParaRPr lang="en-GB"/>
           </a:p>
@@ -1837,7 +1837,7 @@
           <a:p>
             <a:fld id="{EC1BCD71-190D-426B-85E9-B8B75E5C9734}" type="datetimeFigureOut">
               <a:rPr lang="en-GB" smtClean="0"/>
-              <a:t>24/07/2023</a:t>
+              <a:t>28/07/2023</a:t>
             </a:fld>
             <a:endParaRPr lang="en-GB"/>
           </a:p>
@@ -1979,7 +1979,7 @@
           <a:p>
             <a:fld id="{EC1BCD71-190D-426B-85E9-B8B75E5C9734}" type="datetimeFigureOut">
               <a:rPr lang="en-GB" smtClean="0"/>
-              <a:t>24/07/2023</a:t>
+              <a:t>28/07/2023</a:t>
             </a:fld>
             <a:endParaRPr lang="en-GB"/>
           </a:p>
@@ -2092,7 +2092,7 @@
           <a:p>
             <a:fld id="{EC1BCD71-190D-426B-85E9-B8B75E5C9734}" type="datetimeFigureOut">
               <a:rPr lang="en-GB" smtClean="0"/>
-              <a:t>24/07/2023</a:t>
+              <a:t>28/07/2023</a:t>
             </a:fld>
             <a:endParaRPr lang="en-GB"/>
           </a:p>
@@ -2405,7 +2405,7 @@
           <a:p>
             <a:fld id="{EC1BCD71-190D-426B-85E9-B8B75E5C9734}" type="datetimeFigureOut">
               <a:rPr lang="en-GB" smtClean="0"/>
-              <a:t>24/07/2023</a:t>
+              <a:t>28/07/2023</a:t>
             </a:fld>
             <a:endParaRPr lang="en-GB"/>
           </a:p>
@@ -2694,7 +2694,7 @@
           <a:p>
             <a:fld id="{EC1BCD71-190D-426B-85E9-B8B75E5C9734}" type="datetimeFigureOut">
               <a:rPr lang="en-GB" smtClean="0"/>
-              <a:t>24/07/2023</a:t>
+              <a:t>28/07/2023</a:t>
             </a:fld>
             <a:endParaRPr lang="en-GB"/>
           </a:p>
@@ -2937,7 +2937,7 @@
           <a:p>
             <a:fld id="{EC1BCD71-190D-426B-85E9-B8B75E5C9734}" type="datetimeFigureOut">
               <a:rPr lang="en-GB" smtClean="0"/>
-              <a:t>24/07/2023</a:t>
+              <a:t>28/07/2023</a:t>
             </a:fld>
             <a:endParaRPr lang="en-GB"/>
           </a:p>

</xml_diff>